<commit_message>
Updated Logic Component Sequence Diagram
</commit_message>
<xml_diff>
--- a/docs/diagrams/LogicComponentSequenceDiagram.pptx
+++ b/docs/diagrams/LogicComponentSequenceDiagram.pptx
@@ -126,10 +126,6 @@
 </p:presentation>
 </file>
 
-<file path=ppt/revisionInfo.xml><?xml version="1.0" encoding="utf-8"?>
-<p1510:revInfo xmlns:a="http://schemas.openxmlformats.org/drawingml/2006/main" xmlns:r="http://schemas.openxmlformats.org/officeDocument/2006/relationships" xmlns:p1510="http://schemas.microsoft.com/office/powerpoint/2015/10/main"/>
-</file>
-
 <file path=ppt/notesMasters/notesMaster1.xml><?xml version="1.0" encoding="utf-8"?>
 <p:notesMaster xmlns:a="http://schemas.openxmlformats.org/drawingml/2006/main" xmlns:r="http://schemas.openxmlformats.org/officeDocument/2006/relationships" xmlns:p="http://schemas.openxmlformats.org/presentationml/2006/main">
   <p:cSld>
@@ -212,7 +208,7 @@
           <a:p>
             <a:fld id="{F5CC4B3F-88C1-4FFA-B1B6-F41C21DC6924}" type="datetimeFigureOut">
               <a:rPr lang="en-US" smtClean="0"/>
-              <a:t>7/11/2017</a:t>
+              <a:t>3/20/2018</a:t>
             </a:fld>
             <a:endParaRPr lang="en-US"/>
           </a:p>
@@ -658,7 +654,7 @@
           <a:p>
             <a:fld id="{78C97017-6FC3-485B-9764-EAC9E56C1D49}" type="datetimeFigureOut">
               <a:rPr lang="en-US" smtClean="0"/>
-              <a:t>7/11/2017</a:t>
+              <a:t>3/20/2018</a:t>
             </a:fld>
             <a:endParaRPr lang="en-US"/>
           </a:p>
@@ -826,7 +822,7 @@
           <a:p>
             <a:fld id="{78C97017-6FC3-485B-9764-EAC9E56C1D49}" type="datetimeFigureOut">
               <a:rPr lang="en-US" smtClean="0"/>
-              <a:t>7/11/2017</a:t>
+              <a:t>3/20/2018</a:t>
             </a:fld>
             <a:endParaRPr lang="en-US"/>
           </a:p>
@@ -1004,7 +1000,7 @@
           <a:p>
             <a:fld id="{78C97017-6FC3-485B-9764-EAC9E56C1D49}" type="datetimeFigureOut">
               <a:rPr lang="en-US" smtClean="0"/>
-              <a:t>7/11/2017</a:t>
+              <a:t>3/20/2018</a:t>
             </a:fld>
             <a:endParaRPr lang="en-US"/>
           </a:p>
@@ -1172,7 +1168,7 @@
           <a:p>
             <a:fld id="{78C97017-6FC3-485B-9764-EAC9E56C1D49}" type="datetimeFigureOut">
               <a:rPr lang="en-US" smtClean="0"/>
-              <a:t>7/11/2017</a:t>
+              <a:t>3/20/2018</a:t>
             </a:fld>
             <a:endParaRPr lang="en-US"/>
           </a:p>
@@ -1417,7 +1413,7 @@
           <a:p>
             <a:fld id="{78C97017-6FC3-485B-9764-EAC9E56C1D49}" type="datetimeFigureOut">
               <a:rPr lang="en-US" smtClean="0"/>
-              <a:t>7/11/2017</a:t>
+              <a:t>3/20/2018</a:t>
             </a:fld>
             <a:endParaRPr lang="en-US"/>
           </a:p>
@@ -1702,7 +1698,7 @@
           <a:p>
             <a:fld id="{78C97017-6FC3-485B-9764-EAC9E56C1D49}" type="datetimeFigureOut">
               <a:rPr lang="en-US" smtClean="0"/>
-              <a:t>7/11/2017</a:t>
+              <a:t>3/20/2018</a:t>
             </a:fld>
             <a:endParaRPr lang="en-US"/>
           </a:p>
@@ -2121,7 +2117,7 @@
           <a:p>
             <a:fld id="{78C97017-6FC3-485B-9764-EAC9E56C1D49}" type="datetimeFigureOut">
               <a:rPr lang="en-US" smtClean="0"/>
-              <a:t>7/11/2017</a:t>
+              <a:t>3/20/2018</a:t>
             </a:fld>
             <a:endParaRPr lang="en-US"/>
           </a:p>
@@ -2238,7 +2234,7 @@
           <a:p>
             <a:fld id="{78C97017-6FC3-485B-9764-EAC9E56C1D49}" type="datetimeFigureOut">
               <a:rPr lang="en-US" smtClean="0"/>
-              <a:t>7/11/2017</a:t>
+              <a:t>3/20/2018</a:t>
             </a:fld>
             <a:endParaRPr lang="en-US"/>
           </a:p>
@@ -2333,7 +2329,7 @@
           <a:p>
             <a:fld id="{78C97017-6FC3-485B-9764-EAC9E56C1D49}" type="datetimeFigureOut">
               <a:rPr lang="en-US" smtClean="0"/>
-              <a:t>7/11/2017</a:t>
+              <a:t>3/20/2018</a:t>
             </a:fld>
             <a:endParaRPr lang="en-US"/>
           </a:p>
@@ -2608,7 +2604,7 @@
           <a:p>
             <a:fld id="{78C97017-6FC3-485B-9764-EAC9E56C1D49}" type="datetimeFigureOut">
               <a:rPr lang="en-US" smtClean="0"/>
-              <a:t>7/11/2017</a:t>
+              <a:t>3/20/2018</a:t>
             </a:fld>
             <a:endParaRPr lang="en-US"/>
           </a:p>
@@ -2860,7 +2856,7 @@
           <a:p>
             <a:fld id="{78C97017-6FC3-485B-9764-EAC9E56C1D49}" type="datetimeFigureOut">
               <a:rPr lang="en-US" smtClean="0"/>
-              <a:t>7/11/2017</a:t>
+              <a:t>3/20/2018</a:t>
             </a:fld>
             <a:endParaRPr lang="en-US"/>
           </a:p>
@@ -3071,7 +3067,7 @@
           <a:p>
             <a:fld id="{78C97017-6FC3-485B-9764-EAC9E56C1D49}" type="datetimeFigureOut">
               <a:rPr lang="en-US" smtClean="0"/>
-              <a:t>7/11/2017</a:t>
+              <a:t>3/20/2018</a:t>
             </a:fld>
             <a:endParaRPr lang="en-US"/>
           </a:p>
@@ -3666,8 +3662,8 @@
         </p:nvSpPr>
         <p:spPr>
           <a:xfrm>
-            <a:off x="2743200" y="2179309"/>
-            <a:ext cx="1219200" cy="467684"/>
+            <a:off x="2743199" y="2179309"/>
+            <a:ext cx="1424841" cy="467684"/>
           </a:xfrm>
           <a:prstGeom prst="rect">
             <a:avLst/>
@@ -3707,18 +3703,15 @@
                   <a:schemeClr val="bg1"/>
                 </a:solidFill>
               </a:rPr>
-              <a:t>:Address</a:t>
-            </a:r>
-          </a:p>
-          <a:p>
-            <a:pPr algn="ctr"/>
+              <a:t>:</a:t>
+            </a:r>
             <a:r>
               <a:rPr lang="en-US" sz="1600" dirty="0" err="1">
                 <a:solidFill>
                   <a:schemeClr val="bg1"/>
                 </a:solidFill>
               </a:rPr>
-              <a:t>BookParser</a:t>
+              <a:t>EventPlannerParser</a:t>
             </a:r>
             <a:endParaRPr lang="en-SG" sz="1600" dirty="0">
               <a:solidFill>
@@ -3825,7 +3818,7 @@
         <p:spPr>
           <a:xfrm>
             <a:off x="6221565" y="3312740"/>
-            <a:ext cx="1093635" cy="461538"/>
+            <a:ext cx="1452102" cy="461538"/>
           </a:xfrm>
           <a:prstGeom prst="rect">
             <a:avLst/>
@@ -3865,7 +3858,7 @@
                   <a:schemeClr val="bg1"/>
                 </a:solidFill>
               </a:rPr>
-              <a:t>d:Delete</a:t>
+              <a:t>d:DeletePerson</a:t>
             </a:r>
             <a:br>
               <a:rPr lang="en-US" sz="1600" dirty="0">
@@ -5093,7 +5086,7 @@
                   <a:schemeClr val="bg1"/>
                 </a:solidFill>
               </a:rPr>
-              <a:t>DeleteCommand</a:t>
+              <a:t>DeletePerson</a:t>
             </a:r>
             <a:endParaRPr lang="en-US" sz="1600" dirty="0">
               <a:solidFill>
@@ -5104,12 +5097,12 @@
           <a:p>
             <a:pPr algn="ctr"/>
             <a:r>
-              <a:rPr lang="en-US" sz="1600" dirty="0">
+              <a:rPr lang="en-US" sz="1600" dirty="0" err="1">
                 <a:solidFill>
                   <a:schemeClr val="bg1"/>
                 </a:solidFill>
               </a:rPr>
-              <a:t>Parser</a:t>
+              <a:t>CommandParser</a:t>
             </a:r>
             <a:endParaRPr lang="en-SG" sz="1600" dirty="0">
               <a:solidFill>

</xml_diff>